<commit_message>
Update Lecture 12 and Assignment 3
Finalize all powerpoints, update Assignment 3 pdf.
</commit_message>
<xml_diff>
--- a/Lecture02_UnivariateOLS/Lecture2_OLS_2022F.pptx
+++ b/Lecture02_UnivariateOLS/Lecture2_OLS_2022F.pptx
@@ -255,7 +255,7 @@
           <a:p>
             <a:fld id="{EF911157-0FC2-4F06-8D61-FD647FE4E19D}" type="datetimeFigureOut">
               <a:rPr lang="en-US" smtClean="0"/>
-              <a:t>8/9/2022</a:t>
+              <a:t>8/19/2022</a:t>
             </a:fld>
             <a:endParaRPr lang="en-US"/>
           </a:p>
@@ -4322,7 +4322,7 @@
             <a:fld id="{0972D05C-DCFB-4BB6-B49C-AC126BF3ED2C}" type="datetimeFigureOut">
               <a:rPr lang="en-US" smtClean="0"/>
               <a:pPr/>
-              <a:t>8/9/2022</a:t>
+              <a:t>8/19/2022</a:t>
             </a:fld>
             <a:endParaRPr lang="en-US"/>
           </a:p>
@@ -4552,7 +4552,7 @@
             <a:fld id="{0972D05C-DCFB-4BB6-B49C-AC126BF3ED2C}" type="datetimeFigureOut">
               <a:rPr lang="en-US" smtClean="0"/>
               <a:pPr/>
-              <a:t>8/9/2022</a:t>
+              <a:t>8/19/2022</a:t>
             </a:fld>
             <a:endParaRPr lang="en-US"/>
           </a:p>
@@ -4734,7 +4734,7 @@
             <a:fld id="{0972D05C-DCFB-4BB6-B49C-AC126BF3ED2C}" type="datetimeFigureOut">
               <a:rPr lang="en-US" smtClean="0"/>
               <a:pPr/>
-              <a:t>8/9/2022</a:t>
+              <a:t>8/19/2022</a:t>
             </a:fld>
             <a:endParaRPr lang="en-US"/>
           </a:p>
@@ -4906,7 +4906,7 @@
             <a:fld id="{0972D05C-DCFB-4BB6-B49C-AC126BF3ED2C}" type="datetimeFigureOut">
               <a:rPr lang="en-US" smtClean="0"/>
               <a:pPr/>
-              <a:t>8/9/2022</a:t>
+              <a:t>8/19/2022</a:t>
             </a:fld>
             <a:endParaRPr lang="en-US"/>
           </a:p>
@@ -5162,7 +5162,7 @@
             <a:fld id="{0972D05C-DCFB-4BB6-B49C-AC126BF3ED2C}" type="datetimeFigureOut">
               <a:rPr lang="en-US" smtClean="0"/>
               <a:pPr/>
-              <a:t>8/9/2022</a:t>
+              <a:t>8/19/2022</a:t>
             </a:fld>
             <a:endParaRPr lang="en-US"/>
           </a:p>
@@ -5490,7 +5490,7 @@
             <a:fld id="{0972D05C-DCFB-4BB6-B49C-AC126BF3ED2C}" type="datetimeFigureOut">
               <a:rPr lang="en-US" smtClean="0"/>
               <a:pPr/>
-              <a:t>8/9/2022</a:t>
+              <a:t>8/19/2022</a:t>
             </a:fld>
             <a:endParaRPr lang="en-US"/>
           </a:p>
@@ -5943,7 +5943,7 @@
             <a:fld id="{0972D05C-DCFB-4BB6-B49C-AC126BF3ED2C}" type="datetimeFigureOut">
               <a:rPr lang="en-US" smtClean="0"/>
               <a:pPr/>
-              <a:t>8/9/2022</a:t>
+              <a:t>8/19/2022</a:t>
             </a:fld>
             <a:endParaRPr lang="en-US"/>
           </a:p>
@@ -6063,7 +6063,7 @@
             <a:fld id="{0972D05C-DCFB-4BB6-B49C-AC126BF3ED2C}" type="datetimeFigureOut">
               <a:rPr lang="en-US" smtClean="0"/>
               <a:pPr/>
-              <a:t>8/9/2022</a:t>
+              <a:t>8/19/2022</a:t>
             </a:fld>
             <a:endParaRPr lang="en-US"/>
           </a:p>
@@ -6160,7 +6160,7 @@
             <a:fld id="{0972D05C-DCFB-4BB6-B49C-AC126BF3ED2C}" type="datetimeFigureOut">
               <a:rPr lang="en-US" smtClean="0"/>
               <a:pPr/>
-              <a:t>8/9/2022</a:t>
+              <a:t>8/19/2022</a:t>
             </a:fld>
             <a:endParaRPr lang="en-US"/>
           </a:p>
@@ -6449,7 +6449,7 @@
             <a:fld id="{0972D05C-DCFB-4BB6-B49C-AC126BF3ED2C}" type="datetimeFigureOut">
               <a:rPr lang="en-US" smtClean="0"/>
               <a:pPr/>
-              <a:t>8/9/2022</a:t>
+              <a:t>8/19/2022</a:t>
             </a:fld>
             <a:endParaRPr lang="en-US"/>
           </a:p>
@@ -6773,7 +6773,7 @@
             <a:fld id="{0972D05C-DCFB-4BB6-B49C-AC126BF3ED2C}" type="datetimeFigureOut">
               <a:rPr lang="en-US" smtClean="0"/>
               <a:pPr/>
-              <a:t>8/9/2022</a:t>
+              <a:t>8/19/2022</a:t>
             </a:fld>
             <a:endParaRPr lang="en-US"/>
           </a:p>
@@ -7028,7 +7028,7 @@
             <a:fld id="{0972D05C-DCFB-4BB6-B49C-AC126BF3ED2C}" type="datetimeFigureOut">
               <a:rPr lang="en-US" smtClean="0"/>
               <a:pPr/>
-              <a:t>8/9/2022</a:t>
+              <a:t>8/19/2022</a:t>
             </a:fld>
             <a:endParaRPr lang="en-US" dirty="0"/>
           </a:p>
@@ -8896,8 +8896,8 @@
           </a:p>
         </p:txBody>
       </p:sp>
-      <mc:AlternateContent xmlns:mc="http://schemas.openxmlformats.org/markup-compatibility/2006">
-        <mc:Choice xmlns:a14="http://schemas.microsoft.com/office/drawing/2010/main" Requires="a14">
+      <mc:AlternateContent xmlns:mc="http://schemas.openxmlformats.org/markup-compatibility/2006" xmlns:a14="http://schemas.microsoft.com/office/drawing/2010/main">
+        <mc:Choice Requires="a14">
           <p:sp>
             <p:nvSpPr>
               <p:cNvPr id="3" name="Content Placeholder 2"/>
@@ -9178,7 +9178,7 @@
             </p:txBody>
           </p:sp>
         </mc:Choice>
-        <mc:Fallback>
+        <mc:Fallback xmlns="">
           <p:sp>
             <p:nvSpPr>
               <p:cNvPr id="3" name="Content Placeholder 2"/>
@@ -10746,8 +10746,8 @@
           </a:p>
         </p:txBody>
       </p:sp>
-      <mc:AlternateContent xmlns:mc="http://schemas.openxmlformats.org/markup-compatibility/2006">
-        <mc:Choice xmlns:a14="http://schemas.microsoft.com/office/drawing/2010/main" Requires="a14">
+      <mc:AlternateContent xmlns:mc="http://schemas.openxmlformats.org/markup-compatibility/2006" xmlns:a14="http://schemas.microsoft.com/office/drawing/2010/main">
+        <mc:Choice Requires="a14">
           <p:sp>
             <p:nvSpPr>
               <p:cNvPr id="3" name="Content Placeholder 2"/>
@@ -11235,7 +11235,7 @@
             </p:txBody>
           </p:sp>
         </mc:Choice>
-        <mc:Fallback>
+        <mc:Fallback xmlns="">
           <p:sp>
             <p:nvSpPr>
               <p:cNvPr id="3" name="Content Placeholder 2"/>
@@ -14171,8 +14171,8 @@
           </a:p>
         </p:txBody>
       </p:sp>
-      <mc:AlternateContent xmlns:mc="http://schemas.openxmlformats.org/markup-compatibility/2006">
-        <mc:Choice xmlns:a14="http://schemas.microsoft.com/office/drawing/2010/main" Requires="a14">
+      <mc:AlternateContent xmlns:mc="http://schemas.openxmlformats.org/markup-compatibility/2006" xmlns:a14="http://schemas.microsoft.com/office/drawing/2010/main">
+        <mc:Choice Requires="a14">
           <p:sp>
             <p:nvSpPr>
               <p:cNvPr id="3" name="Content Placeholder 2"/>
@@ -15103,7 +15103,7 @@
             </p:txBody>
           </p:sp>
         </mc:Choice>
-        <mc:Fallback>
+        <mc:Fallback xmlns="">
           <p:sp>
             <p:nvSpPr>
               <p:cNvPr id="3" name="Content Placeholder 2"/>
@@ -17389,8 +17389,8 @@
           </a:p>
         </p:txBody>
       </p:sp>
-      <mc:AlternateContent xmlns:mc="http://schemas.openxmlformats.org/markup-compatibility/2006">
-        <mc:Choice xmlns:a14="http://schemas.microsoft.com/office/drawing/2010/main" Requires="a14">
+      <mc:AlternateContent xmlns:mc="http://schemas.openxmlformats.org/markup-compatibility/2006" xmlns:a14="http://schemas.microsoft.com/office/drawing/2010/main">
+        <mc:Choice Requires="a14">
           <p:sp>
             <p:nvSpPr>
               <p:cNvPr id="3" name="Content Placeholder 2"/>
@@ -17486,7 +17486,7 @@
             </p:txBody>
           </p:sp>
         </mc:Choice>
-        <mc:Fallback>
+        <mc:Fallback xmlns="">
           <p:sp>
             <p:nvSpPr>
               <p:cNvPr id="3" name="Content Placeholder 2"/>
@@ -17589,8 +17589,8 @@
           </a:p>
         </p:txBody>
       </p:sp>
-      <mc:AlternateContent xmlns:mc="http://schemas.openxmlformats.org/markup-compatibility/2006">
-        <mc:Choice xmlns:a14="http://schemas.microsoft.com/office/drawing/2010/main" Requires="a14">
+      <mc:AlternateContent xmlns:mc="http://schemas.openxmlformats.org/markup-compatibility/2006" xmlns:a14="http://schemas.microsoft.com/office/drawing/2010/main">
+        <mc:Choice Requires="a14">
           <p:sp>
             <p:nvSpPr>
               <p:cNvPr id="3" name="Content Placeholder 2"/>
@@ -17736,7 +17736,7 @@
             </p:txBody>
           </p:sp>
         </mc:Choice>
-        <mc:Fallback>
+        <mc:Fallback xmlns="">
           <p:sp>
             <p:nvSpPr>
               <p:cNvPr id="3" name="Content Placeholder 2"/>
@@ -18305,8 +18305,8 @@
           </a:p>
         </p:txBody>
       </p:sp>
-      <mc:AlternateContent xmlns:mc="http://schemas.openxmlformats.org/markup-compatibility/2006">
-        <mc:Choice xmlns:a14="http://schemas.microsoft.com/office/drawing/2010/main" Requires="a14">
+      <mc:AlternateContent xmlns:mc="http://schemas.openxmlformats.org/markup-compatibility/2006" xmlns:a14="http://schemas.microsoft.com/office/drawing/2010/main">
+        <mc:Choice Requires="a14">
           <p:sp>
             <p:nvSpPr>
               <p:cNvPr id="3" name="Content Placeholder 2"/>
@@ -18941,7 +18941,7 @@
             </p:txBody>
           </p:sp>
         </mc:Choice>
-        <mc:Fallback>
+        <mc:Fallback xmlns="">
           <p:sp>
             <p:nvSpPr>
               <p:cNvPr id="3" name="Content Placeholder 2"/>
@@ -19988,8 +19988,8 @@
           </a:p>
         </p:txBody>
       </p:sp>
-      <mc:AlternateContent xmlns:mc="http://schemas.openxmlformats.org/markup-compatibility/2006">
-        <mc:Choice xmlns:a14="http://schemas.microsoft.com/office/drawing/2010/main" Requires="a14">
+      <mc:AlternateContent xmlns:mc="http://schemas.openxmlformats.org/markup-compatibility/2006" xmlns:a14="http://schemas.microsoft.com/office/drawing/2010/main">
+        <mc:Choice Requires="a14">
           <p:sp>
             <p:nvSpPr>
               <p:cNvPr id="3" name="Content Placeholder 2"/>
@@ -20271,7 +20271,7 @@
             </p:txBody>
           </p:sp>
         </mc:Choice>
-        <mc:Fallback>
+        <mc:Fallback xmlns="">
           <p:sp>
             <p:nvSpPr>
               <p:cNvPr id="3" name="Content Placeholder 2"/>
@@ -20374,8 +20374,8 @@
           </a:p>
         </p:txBody>
       </p:sp>
-      <mc:AlternateContent xmlns:mc="http://schemas.openxmlformats.org/markup-compatibility/2006">
-        <mc:Choice xmlns:a14="http://schemas.microsoft.com/office/drawing/2010/main" Requires="a14">
+      <mc:AlternateContent xmlns:mc="http://schemas.openxmlformats.org/markup-compatibility/2006" xmlns:a14="http://schemas.microsoft.com/office/drawing/2010/main">
+        <mc:Choice Requires="a14">
           <p:sp>
             <p:nvSpPr>
               <p:cNvPr id="3" name="Content Placeholder 2"/>
@@ -20801,7 +20801,7 @@
             </p:txBody>
           </p:sp>
         </mc:Choice>
-        <mc:Fallback>
+        <mc:Fallback xmlns="">
           <p:sp>
             <p:nvSpPr>
               <p:cNvPr id="3" name="Content Placeholder 2"/>
@@ -20904,8 +20904,8 @@
           </a:p>
         </p:txBody>
       </p:sp>
-      <mc:AlternateContent xmlns:mc="http://schemas.openxmlformats.org/markup-compatibility/2006">
-        <mc:Choice xmlns:a14="http://schemas.microsoft.com/office/drawing/2010/main" Requires="a14">
+      <mc:AlternateContent xmlns:mc="http://schemas.openxmlformats.org/markup-compatibility/2006" xmlns:a14="http://schemas.microsoft.com/office/drawing/2010/main">
+        <mc:Choice Requires="a14">
           <p:sp>
             <p:nvSpPr>
               <p:cNvPr id="3" name="Content Placeholder 2"/>
@@ -21492,7 +21492,7 @@
             </p:txBody>
           </p:sp>
         </mc:Choice>
-        <mc:Fallback>
+        <mc:Fallback xmlns="">
           <p:sp>
             <p:nvSpPr>
               <p:cNvPr id="3" name="Content Placeholder 2"/>
@@ -21595,8 +21595,8 @@
           </a:p>
         </p:txBody>
       </p:sp>
-      <mc:AlternateContent xmlns:mc="http://schemas.openxmlformats.org/markup-compatibility/2006">
-        <mc:Choice xmlns:a14="http://schemas.microsoft.com/office/drawing/2010/main" Requires="a14">
+      <mc:AlternateContent xmlns:mc="http://schemas.openxmlformats.org/markup-compatibility/2006" xmlns:a14="http://schemas.microsoft.com/office/drawing/2010/main">
+        <mc:Choice Requires="a14">
           <p:sp>
             <p:nvSpPr>
               <p:cNvPr id="3" name="Content Placeholder 2"/>
@@ -22402,7 +22402,7 @@
             </p:txBody>
           </p:sp>
         </mc:Choice>
-        <mc:Fallback>
+        <mc:Fallback xmlns="">
           <p:sp>
             <p:nvSpPr>
               <p:cNvPr id="3" name="Content Placeholder 2"/>
@@ -22512,8 +22512,8 @@
           </a:p>
         </p:txBody>
       </p:sp>
-      <mc:AlternateContent xmlns:mc="http://schemas.openxmlformats.org/markup-compatibility/2006">
-        <mc:Choice xmlns:a14="http://schemas.microsoft.com/office/drawing/2010/main" Requires="a14">
+      <mc:AlternateContent xmlns:mc="http://schemas.openxmlformats.org/markup-compatibility/2006" xmlns:a14="http://schemas.microsoft.com/office/drawing/2010/main">
+        <mc:Choice Requires="a14">
           <p:sp>
             <p:nvSpPr>
               <p:cNvPr id="3" name="Content Placeholder 2"/>
@@ -23141,7 +23141,7 @@
             </p:txBody>
           </p:sp>
         </mc:Choice>
-        <mc:Fallback>
+        <mc:Fallback xmlns="">
           <p:sp>
             <p:nvSpPr>
               <p:cNvPr id="3" name="Content Placeholder 2"/>
@@ -23251,8 +23251,8 @@
           </a:p>
         </p:txBody>
       </p:sp>
-      <mc:AlternateContent xmlns:mc="http://schemas.openxmlformats.org/markup-compatibility/2006">
-        <mc:Choice xmlns:a14="http://schemas.microsoft.com/office/drawing/2010/main" Requires="a14">
+      <mc:AlternateContent xmlns:mc="http://schemas.openxmlformats.org/markup-compatibility/2006" xmlns:a14="http://schemas.microsoft.com/office/drawing/2010/main">
+        <mc:Choice Requires="a14">
           <p:sp>
             <p:nvSpPr>
               <p:cNvPr id="3" name="Content Placeholder 2"/>
@@ -23844,7 +23844,7 @@
             </p:txBody>
           </p:sp>
         </mc:Choice>
-        <mc:Fallback>
+        <mc:Fallback xmlns="">
           <p:sp>
             <p:nvSpPr>
               <p:cNvPr id="3" name="Content Placeholder 2"/>
@@ -23944,8 +23944,8 @@
           </a:p>
         </p:txBody>
       </p:sp>
-      <mc:AlternateContent xmlns:mc="http://schemas.openxmlformats.org/markup-compatibility/2006">
-        <mc:Choice xmlns:a14="http://schemas.microsoft.com/office/drawing/2010/main" Requires="a14">
+      <mc:AlternateContent xmlns:mc="http://schemas.openxmlformats.org/markup-compatibility/2006" xmlns:a14="http://schemas.microsoft.com/office/drawing/2010/main">
+        <mc:Choice Requires="a14">
           <p:sp>
             <p:nvSpPr>
               <p:cNvPr id="3" name="Content Placeholder 2"/>
@@ -25284,7 +25284,7 @@
             </p:txBody>
           </p:sp>
         </mc:Choice>
-        <mc:Fallback>
+        <mc:Fallback xmlns="">
           <p:sp>
             <p:nvSpPr>
               <p:cNvPr id="3" name="Content Placeholder 2"/>
@@ -25431,8 +25431,8 @@
           </a:p>
         </p:txBody>
       </p:sp>
-      <mc:AlternateContent xmlns:mc="http://schemas.openxmlformats.org/markup-compatibility/2006">
-        <mc:Choice xmlns:a14="http://schemas.microsoft.com/office/drawing/2010/main" Requires="a14">
+      <mc:AlternateContent xmlns:mc="http://schemas.openxmlformats.org/markup-compatibility/2006" xmlns:a14="http://schemas.microsoft.com/office/drawing/2010/main">
+        <mc:Choice Requires="a14">
           <p:sp>
             <p:nvSpPr>
               <p:cNvPr id="3" name="Content Placeholder 2"/>
@@ -26301,7 +26301,7 @@
             </p:txBody>
           </p:sp>
         </mc:Choice>
-        <mc:Fallback>
+        <mc:Fallback xmlns="">
           <p:sp>
             <p:nvSpPr>
               <p:cNvPr id="3" name="Content Placeholder 2"/>
@@ -26448,8 +26448,8 @@
           </a:p>
         </p:txBody>
       </p:sp>
-      <mc:AlternateContent xmlns:mc="http://schemas.openxmlformats.org/markup-compatibility/2006">
-        <mc:Choice xmlns:a14="http://schemas.microsoft.com/office/drawing/2010/main" Requires="a14">
+      <mc:AlternateContent xmlns:mc="http://schemas.openxmlformats.org/markup-compatibility/2006" xmlns:a14="http://schemas.microsoft.com/office/drawing/2010/main">
+        <mc:Choice Requires="a14">
           <p:sp>
             <p:nvSpPr>
               <p:cNvPr id="3" name="Content Placeholder 2"/>
@@ -27154,7 +27154,7 @@
             </p:txBody>
           </p:sp>
         </mc:Choice>
-        <mc:Fallback>
+        <mc:Fallback xmlns="">
           <p:sp>
             <p:nvSpPr>
               <p:cNvPr id="3" name="Content Placeholder 2"/>
@@ -27254,8 +27254,8 @@
           </a:p>
         </p:txBody>
       </p:sp>
-      <mc:AlternateContent xmlns:mc="http://schemas.openxmlformats.org/markup-compatibility/2006">
-        <mc:Choice xmlns:a14="http://schemas.microsoft.com/office/drawing/2010/main" Requires="a14">
+      <mc:AlternateContent xmlns:mc="http://schemas.openxmlformats.org/markup-compatibility/2006" xmlns:a14="http://schemas.microsoft.com/office/drawing/2010/main">
+        <mc:Choice Requires="a14">
           <p:sp>
             <p:nvSpPr>
               <p:cNvPr id="3" name="Content Placeholder 2"/>
@@ -27997,7 +27997,7 @@
             </p:txBody>
           </p:sp>
         </mc:Choice>
-        <mc:Fallback>
+        <mc:Fallback xmlns="">
           <p:sp>
             <p:nvSpPr>
               <p:cNvPr id="3" name="Content Placeholder 2"/>
@@ -28335,8 +28335,8 @@
           </a:p>
         </p:txBody>
       </p:sp>
-      <mc:AlternateContent xmlns:mc="http://schemas.openxmlformats.org/markup-compatibility/2006">
-        <mc:Choice xmlns:a14="http://schemas.microsoft.com/office/drawing/2010/main" Requires="a14">
+      <mc:AlternateContent xmlns:mc="http://schemas.openxmlformats.org/markup-compatibility/2006" xmlns:a14="http://schemas.microsoft.com/office/drawing/2010/main">
+        <mc:Choice Requires="a14">
           <p:sp>
             <p:nvSpPr>
               <p:cNvPr id="3" name="Content Placeholder 2"/>
@@ -29004,7 +29004,7 @@
             </p:txBody>
           </p:sp>
         </mc:Choice>
-        <mc:Fallback>
+        <mc:Fallback xmlns="">
           <p:sp>
             <p:nvSpPr>
               <p:cNvPr id="3" name="Content Placeholder 2"/>
@@ -29104,8 +29104,8 @@
           </a:p>
         </p:txBody>
       </p:sp>
-      <mc:AlternateContent xmlns:mc="http://schemas.openxmlformats.org/markup-compatibility/2006">
-        <mc:Choice xmlns:a14="http://schemas.microsoft.com/office/drawing/2010/main" Requires="a14">
+      <mc:AlternateContent xmlns:mc="http://schemas.openxmlformats.org/markup-compatibility/2006" xmlns:a14="http://schemas.microsoft.com/office/drawing/2010/main">
+        <mc:Choice Requires="a14">
           <p:sp>
             <p:nvSpPr>
               <p:cNvPr id="3" name="Content Placeholder 2"/>
@@ -29719,7 +29719,7 @@
             </p:txBody>
           </p:sp>
         </mc:Choice>
-        <mc:Fallback>
+        <mc:Fallback xmlns="">
           <p:sp>
             <p:nvSpPr>
               <p:cNvPr id="3" name="Content Placeholder 2"/>
@@ -29866,8 +29866,8 @@
           </a:p>
         </p:txBody>
       </p:sp>
-      <mc:AlternateContent xmlns:mc="http://schemas.openxmlformats.org/markup-compatibility/2006">
-        <mc:Choice xmlns:a14="http://schemas.microsoft.com/office/drawing/2010/main" Requires="a14">
+      <mc:AlternateContent xmlns:mc="http://schemas.openxmlformats.org/markup-compatibility/2006" xmlns:a14="http://schemas.microsoft.com/office/drawing/2010/main">
+        <mc:Choice Requires="a14">
           <p:sp>
             <p:nvSpPr>
               <p:cNvPr id="3" name="Content Placeholder 2"/>
@@ -30542,7 +30542,7 @@
             </p:txBody>
           </p:sp>
         </mc:Choice>
-        <mc:Fallback>
+        <mc:Fallback xmlns="">
           <p:sp>
             <p:nvSpPr>
               <p:cNvPr id="3" name="Content Placeholder 2"/>
@@ -30760,8 +30760,8 @@
           </a:p>
         </p:txBody>
       </p:sp>
-      <mc:AlternateContent xmlns:mc="http://schemas.openxmlformats.org/markup-compatibility/2006">
-        <mc:Choice xmlns:a14="http://schemas.microsoft.com/office/drawing/2010/main" Requires="a14">
+      <mc:AlternateContent xmlns:mc="http://schemas.openxmlformats.org/markup-compatibility/2006" xmlns:a14="http://schemas.microsoft.com/office/drawing/2010/main">
+        <mc:Choice Requires="a14">
           <p:sp>
             <p:nvSpPr>
               <p:cNvPr id="3" name="Content Placeholder 2"/>
@@ -31642,7 +31642,7 @@
             </p:txBody>
           </p:sp>
         </mc:Choice>
-        <mc:Fallback>
+        <mc:Fallback xmlns="">
           <p:sp>
             <p:nvSpPr>
               <p:cNvPr id="3" name="Content Placeholder 2"/>
@@ -31742,8 +31742,8 @@
           </a:p>
         </p:txBody>
       </p:sp>
-      <mc:AlternateContent xmlns:mc="http://schemas.openxmlformats.org/markup-compatibility/2006">
-        <mc:Choice xmlns:a14="http://schemas.microsoft.com/office/drawing/2010/main" Requires="a14">
+      <mc:AlternateContent xmlns:mc="http://schemas.openxmlformats.org/markup-compatibility/2006" xmlns:a14="http://schemas.microsoft.com/office/drawing/2010/main">
+        <mc:Choice Requires="a14">
           <p:sp>
             <p:nvSpPr>
               <p:cNvPr id="3" name="Content Placeholder 2"/>
@@ -32730,7 +32730,7 @@
             </p:txBody>
           </p:sp>
         </mc:Choice>
-        <mc:Fallback>
+        <mc:Fallback xmlns="">
           <p:sp>
             <p:nvSpPr>
               <p:cNvPr id="3" name="Content Placeholder 2"/>
@@ -32830,8 +32830,8 @@
           </a:p>
         </p:txBody>
       </p:sp>
-      <mc:AlternateContent xmlns:mc="http://schemas.openxmlformats.org/markup-compatibility/2006">
-        <mc:Choice xmlns:a14="http://schemas.microsoft.com/office/drawing/2010/main" Requires="a14">
+      <mc:AlternateContent xmlns:mc="http://schemas.openxmlformats.org/markup-compatibility/2006" xmlns:a14="http://schemas.microsoft.com/office/drawing/2010/main">
+        <mc:Choice Requires="a14">
           <p:sp>
             <p:nvSpPr>
               <p:cNvPr id="3" name="Content Placeholder 2"/>
@@ -33995,7 +33995,7 @@
             </p:txBody>
           </p:sp>
         </mc:Choice>
-        <mc:Fallback>
+        <mc:Fallback xmlns="">
           <p:sp>
             <p:nvSpPr>
               <p:cNvPr id="3" name="Content Placeholder 2"/>
@@ -34095,8 +34095,8 @@
           </a:p>
         </p:txBody>
       </p:sp>
-      <mc:AlternateContent xmlns:mc="http://schemas.openxmlformats.org/markup-compatibility/2006">
-        <mc:Choice xmlns:a14="http://schemas.microsoft.com/office/drawing/2010/main" Requires="a14">
+      <mc:AlternateContent xmlns:mc="http://schemas.openxmlformats.org/markup-compatibility/2006" xmlns:a14="http://schemas.microsoft.com/office/drawing/2010/main">
+        <mc:Choice Requires="a14">
           <p:sp>
             <p:nvSpPr>
               <p:cNvPr id="3" name="Content Placeholder 2"/>
@@ -35322,7 +35322,7 @@
             </p:txBody>
           </p:sp>
         </mc:Choice>
-        <mc:Fallback>
+        <mc:Fallback xmlns="">
           <p:sp>
             <p:nvSpPr>
               <p:cNvPr id="3" name="Content Placeholder 2"/>
@@ -35663,8 +35663,8 @@
         </p:blipFill>
         <p:spPr bwMode="auto">
           <a:xfrm>
-            <a:off x="1447799" y="1447800"/>
-            <a:ext cx="6034493" cy="5141388"/>
+            <a:off x="137707" y="1524000"/>
+            <a:ext cx="4680000" cy="3987360"/>
           </a:xfrm>
           <a:prstGeom prst="rect">
             <a:avLst/>
@@ -35679,6 +35679,36 @@
               </a14:hiddenFill>
             </a:ext>
           </a:extLst>
+        </p:spPr>
+      </p:pic>
+      <p:pic>
+        <p:nvPicPr>
+          <p:cNvPr id="5" name="Picture 4">
+            <a:extLst>
+              <a:ext uri="{FF2B5EF4-FFF2-40B4-BE49-F238E27FC236}">
+                <a16:creationId xmlns:a16="http://schemas.microsoft.com/office/drawing/2014/main" id="{FB420987-4E4C-E816-724E-440FD352A971}"/>
+              </a:ext>
+            </a:extLst>
+          </p:cNvPr>
+          <p:cNvPicPr>
+            <a:picLocks noChangeAspect="1"/>
+          </p:cNvPicPr>
+          <p:nvPr/>
+        </p:nvPicPr>
+        <p:blipFill>
+          <a:blip r:embed="rId4"/>
+          <a:stretch>
+            <a:fillRect/>
+          </a:stretch>
+        </p:blipFill>
+        <p:spPr>
+          <a:xfrm>
+            <a:off x="4953000" y="1905000"/>
+            <a:ext cx="5753903" cy="1981477"/>
+          </a:xfrm>
+          <a:prstGeom prst="rect">
+            <a:avLst/>
+          </a:prstGeom>
         </p:spPr>
       </p:pic>
     </p:spTree>
@@ -35826,8 +35856,8 @@
           </a:p>
         </p:txBody>
       </p:sp>
-      <mc:AlternateContent xmlns:mc="http://schemas.openxmlformats.org/markup-compatibility/2006">
-        <mc:Choice xmlns:a14="http://schemas.microsoft.com/office/drawing/2010/main" Requires="a14">
+      <mc:AlternateContent xmlns:mc="http://schemas.openxmlformats.org/markup-compatibility/2006" xmlns:a14="http://schemas.microsoft.com/office/drawing/2010/main">
+        <mc:Choice Requires="a14">
           <p:sp>
             <p:nvSpPr>
               <p:cNvPr id="3" name="Content Placeholder 2"/>
@@ -36346,7 +36376,7 @@
             </p:txBody>
           </p:sp>
         </mc:Choice>
-        <mc:Fallback>
+        <mc:Fallback xmlns="">
           <p:sp>
             <p:nvSpPr>
               <p:cNvPr id="3" name="Content Placeholder 2"/>
@@ -36446,8 +36476,8 @@
           </a:p>
         </p:txBody>
       </p:sp>
-      <mc:AlternateContent xmlns:mc="http://schemas.openxmlformats.org/markup-compatibility/2006">
-        <mc:Choice xmlns:a14="http://schemas.microsoft.com/office/drawing/2010/main" Requires="a14">
+      <mc:AlternateContent xmlns:mc="http://schemas.openxmlformats.org/markup-compatibility/2006" xmlns:a14="http://schemas.microsoft.com/office/drawing/2010/main">
+        <mc:Choice Requires="a14">
           <p:sp>
             <p:nvSpPr>
               <p:cNvPr id="3" name="Content Placeholder 2"/>
@@ -37003,7 +37033,7 @@
             </p:txBody>
           </p:sp>
         </mc:Choice>
-        <mc:Fallback>
+        <mc:Fallback xmlns="">
           <p:sp>
             <p:nvSpPr>
               <p:cNvPr id="3" name="Content Placeholder 2"/>

</xml_diff>